<commit_message>
udiagram 및 usecase 수정
</commit_message>
<xml_diff>
--- a/Requirement List.pptx
+++ b/Requirement List.pptx
@@ -198,7 +198,7 @@
           <a:p>
             <a:fld id="{8502C326-3172-694F-8729-40B8C9530334}" type="datetimeFigureOut">
               <a:rPr kumimoji="1" lang="ko-Kore-KR" altLang="en-US" smtClean="0"/>
-              <a:t>2022. 5. 11.</a:t>
+              <a:t>2022. 5. 14.</a:t>
             </a:fld>
             <a:endParaRPr kumimoji="1" lang="ko-Kore-KR" altLang="en-US"/>
           </a:p>
@@ -699,7 +699,7 @@
           <a:p>
             <a:fld id="{6E115D2A-B720-DA4C-BD7C-758C4A1989AB}" type="datetimeFigureOut">
               <a:rPr kumimoji="1" lang="ko-Kore-KR" altLang="en-US" smtClean="0"/>
-              <a:t>2022. 5. 11.</a:t>
+              <a:t>2022. 5. 14.</a:t>
             </a:fld>
             <a:endParaRPr kumimoji="1" lang="ko-Kore-KR" altLang="en-US"/>
           </a:p>
@@ -899,7 +899,7 @@
           <a:p>
             <a:fld id="{6E115D2A-B720-DA4C-BD7C-758C4A1989AB}" type="datetimeFigureOut">
               <a:rPr kumimoji="1" lang="ko-Kore-KR" altLang="en-US" smtClean="0"/>
-              <a:t>2022. 5. 11.</a:t>
+              <a:t>2022. 5. 14.</a:t>
             </a:fld>
             <a:endParaRPr kumimoji="1" lang="ko-Kore-KR" altLang="en-US"/>
           </a:p>
@@ -1109,7 +1109,7 @@
           <a:p>
             <a:fld id="{6E115D2A-B720-DA4C-BD7C-758C4A1989AB}" type="datetimeFigureOut">
               <a:rPr kumimoji="1" lang="ko-Kore-KR" altLang="en-US" smtClean="0"/>
-              <a:t>2022. 5. 11.</a:t>
+              <a:t>2022. 5. 14.</a:t>
             </a:fld>
             <a:endParaRPr kumimoji="1" lang="ko-Kore-KR" altLang="en-US"/>
           </a:p>
@@ -1309,7 +1309,7 @@
           <a:p>
             <a:fld id="{6E115D2A-B720-DA4C-BD7C-758C4A1989AB}" type="datetimeFigureOut">
               <a:rPr kumimoji="1" lang="ko-Kore-KR" altLang="en-US" smtClean="0"/>
-              <a:t>2022. 5. 11.</a:t>
+              <a:t>2022. 5. 14.</a:t>
             </a:fld>
             <a:endParaRPr kumimoji="1" lang="ko-Kore-KR" altLang="en-US"/>
           </a:p>
@@ -1585,7 +1585,7 @@
           <a:p>
             <a:fld id="{6E115D2A-B720-DA4C-BD7C-758C4A1989AB}" type="datetimeFigureOut">
               <a:rPr kumimoji="1" lang="ko-Kore-KR" altLang="en-US" smtClean="0"/>
-              <a:t>2022. 5. 11.</a:t>
+              <a:t>2022. 5. 14.</a:t>
             </a:fld>
             <a:endParaRPr kumimoji="1" lang="ko-Kore-KR" altLang="en-US"/>
           </a:p>
@@ -1853,7 +1853,7 @@
           <a:p>
             <a:fld id="{6E115D2A-B720-DA4C-BD7C-758C4A1989AB}" type="datetimeFigureOut">
               <a:rPr kumimoji="1" lang="ko-Kore-KR" altLang="en-US" smtClean="0"/>
-              <a:t>2022. 5. 11.</a:t>
+              <a:t>2022. 5. 14.</a:t>
             </a:fld>
             <a:endParaRPr kumimoji="1" lang="ko-Kore-KR" altLang="en-US"/>
           </a:p>
@@ -2268,7 +2268,7 @@
           <a:p>
             <a:fld id="{6E115D2A-B720-DA4C-BD7C-758C4A1989AB}" type="datetimeFigureOut">
               <a:rPr kumimoji="1" lang="ko-Kore-KR" altLang="en-US" smtClean="0"/>
-              <a:t>2022. 5. 11.</a:t>
+              <a:t>2022. 5. 14.</a:t>
             </a:fld>
             <a:endParaRPr kumimoji="1" lang="ko-Kore-KR" altLang="en-US"/>
           </a:p>
@@ -2410,7 +2410,7 @@
           <a:p>
             <a:fld id="{6E115D2A-B720-DA4C-BD7C-758C4A1989AB}" type="datetimeFigureOut">
               <a:rPr kumimoji="1" lang="ko-Kore-KR" altLang="en-US" smtClean="0"/>
-              <a:t>2022. 5. 11.</a:t>
+              <a:t>2022. 5. 14.</a:t>
             </a:fld>
             <a:endParaRPr kumimoji="1" lang="ko-Kore-KR" altLang="en-US"/>
           </a:p>
@@ -2523,7 +2523,7 @@
           <a:p>
             <a:fld id="{6E115D2A-B720-DA4C-BD7C-758C4A1989AB}" type="datetimeFigureOut">
               <a:rPr kumimoji="1" lang="ko-Kore-KR" altLang="en-US" smtClean="0"/>
-              <a:t>2022. 5. 11.</a:t>
+              <a:t>2022. 5. 14.</a:t>
             </a:fld>
             <a:endParaRPr kumimoji="1" lang="ko-Kore-KR" altLang="en-US"/>
           </a:p>
@@ -2836,7 +2836,7 @@
           <a:p>
             <a:fld id="{6E115D2A-B720-DA4C-BD7C-758C4A1989AB}" type="datetimeFigureOut">
               <a:rPr kumimoji="1" lang="ko-Kore-KR" altLang="en-US" smtClean="0"/>
-              <a:t>2022. 5. 11.</a:t>
+              <a:t>2022. 5. 14.</a:t>
             </a:fld>
             <a:endParaRPr kumimoji="1" lang="ko-Kore-KR" altLang="en-US"/>
           </a:p>
@@ -3125,7 +3125,7 @@
           <a:p>
             <a:fld id="{6E115D2A-B720-DA4C-BD7C-758C4A1989AB}" type="datetimeFigureOut">
               <a:rPr kumimoji="1" lang="ko-Kore-KR" altLang="en-US" smtClean="0"/>
-              <a:t>2022. 5. 11.</a:t>
+              <a:t>2022. 5. 14.</a:t>
             </a:fld>
             <a:endParaRPr kumimoji="1" lang="ko-Kore-KR" altLang="en-US"/>
           </a:p>
@@ -3368,7 +3368,7 @@
           <a:p>
             <a:fld id="{6E115D2A-B720-DA4C-BD7C-758C4A1989AB}" type="datetimeFigureOut">
               <a:rPr kumimoji="1" lang="ko-Kore-KR" altLang="en-US" smtClean="0"/>
-              <a:t>2022. 5. 11.</a:t>
+              <a:t>2022. 5. 14.</a:t>
             </a:fld>
             <a:endParaRPr kumimoji="1" lang="ko-Kore-KR" altLang="en-US"/>
           </a:p>
@@ -3800,7 +3800,7 @@
           <p:nvPr>
             <p:extLst>
               <p:ext uri="{D42A27DB-BD31-4B8C-83A1-F6EECF244321}">
-                <p14:modId xmlns:p14="http://schemas.microsoft.com/office/powerpoint/2010/main" val="534303894"/>
+                <p14:modId xmlns:p14="http://schemas.microsoft.com/office/powerpoint/2010/main" val="1510829130"/>
               </p:ext>
             </p:extLst>
           </p:nvPr>
@@ -4590,7 +4590,7 @@
                     <a:p>
                       <a:r>
                         <a:rPr lang="ko-KR" altLang="en-US" sz="1500" dirty="0"/>
-                        <a:t>회원이 상품명을 입력하면 이에 해당하는 상품 리스트</a:t>
+                        <a:t>회원이 상품명을 입력하면 이에 해당하는 상품 정보</a:t>
                       </a:r>
                       <a:r>
                         <a:rPr lang="en-US" altLang="ko-KR" sz="1500" dirty="0"/>
@@ -4598,7 +4598,23 @@
                       </a:r>
                       <a:r>
                         <a:rPr lang="ko-KR" altLang="en-US" sz="1500" dirty="0"/>
-                        <a:t>상품명 및 평균 구매만족도 포함</a:t>
+                        <a:t>판매자</a:t>
+                      </a:r>
+                      <a:r>
+                        <a:rPr lang="en-US" altLang="ko-KR" sz="1500" dirty="0"/>
+                        <a:t>ID, </a:t>
+                      </a:r>
+                      <a:r>
+                        <a:rPr lang="ko-KR" altLang="en-US" sz="1500" dirty="0"/>
+                        <a:t>상품명</a:t>
+                      </a:r>
+                      <a:r>
+                        <a:rPr lang="en-US" altLang="ko-KR" sz="1500" dirty="0"/>
+                        <a:t>,</a:t>
+                      </a:r>
+                      <a:r>
+                        <a:rPr lang="ko-KR" altLang="en-US" sz="1500" dirty="0"/>
+                        <a:t> 가격 등</a:t>
                       </a:r>
                       <a:r>
                         <a:rPr lang="en-US" altLang="ko-KR" sz="1500" dirty="0"/>
@@ -4647,7 +4663,7 @@
                       </a:r>
                       <a:r>
                         <a:rPr lang="ko-KR" altLang="en-US" sz="1500" dirty="0"/>
-                        <a:t> 리스트 검색</a:t>
+                        <a:t> 정보 검색</a:t>
                       </a:r>
                       <a:endParaRPr lang="ko-Kore-KR" altLang="en-US" sz="1500" dirty="0"/>
                     </a:p>

</xml_diff>